<commit_message>
Misc. edits and figure addition
  * Adding figure for validation workflow
  * Rewording on the difference between execution and validation
  * Added another paragraph on the re-execution of the ceph experiments
  * other misc. edits
</commit_message>
<xml_diff>
--- a/figures/figures.pptx
+++ b/figures/figures.pptx
@@ -286,7 +286,7 @@
           <a:lstStyle/>
           <a:p>
             <a:fld id="{D4A44E2B-714B-774B-BFB3-DD6F079AF3F0}" type="datetimeFigureOut">
-              <a:t>4/3/15</a:t>
+              <a:t>4/15/15</a:t>
             </a:fld>
             <a:endParaRPr lang="en-US"/>
           </a:p>
@@ -452,7 +452,7 @@
           <a:lstStyle/>
           <a:p>
             <a:fld id="{D4A44E2B-714B-774B-BFB3-DD6F079AF3F0}" type="datetimeFigureOut">
-              <a:t>4/3/15</a:t>
+              <a:t>4/15/15</a:t>
             </a:fld>
             <a:endParaRPr lang="en-US"/>
           </a:p>
@@ -628,7 +628,7 @@
           <a:lstStyle/>
           <a:p>
             <a:fld id="{D4A44E2B-714B-774B-BFB3-DD6F079AF3F0}" type="datetimeFigureOut">
-              <a:t>4/3/15</a:t>
+              <a:t>4/15/15</a:t>
             </a:fld>
             <a:endParaRPr lang="en-US"/>
           </a:p>
@@ -794,7 +794,7 @@
           <a:lstStyle/>
           <a:p>
             <a:fld id="{D4A44E2B-714B-774B-BFB3-DD6F079AF3F0}" type="datetimeFigureOut">
-              <a:t>4/3/15</a:t>
+              <a:t>4/15/15</a:t>
             </a:fld>
             <a:endParaRPr lang="en-US"/>
           </a:p>
@@ -1037,7 +1037,7 @@
           <a:lstStyle/>
           <a:p>
             <a:fld id="{D4A44E2B-714B-774B-BFB3-DD6F079AF3F0}" type="datetimeFigureOut">
-              <a:t>4/3/15</a:t>
+              <a:t>4/15/15</a:t>
             </a:fld>
             <a:endParaRPr lang="en-US"/>
           </a:p>
@@ -1320,7 +1320,7 @@
           <a:lstStyle/>
           <a:p>
             <a:fld id="{D4A44E2B-714B-774B-BFB3-DD6F079AF3F0}" type="datetimeFigureOut">
-              <a:t>4/3/15</a:t>
+              <a:t>4/15/15</a:t>
             </a:fld>
             <a:endParaRPr lang="en-US"/>
           </a:p>
@@ -1737,7 +1737,7 @@
           <a:lstStyle/>
           <a:p>
             <a:fld id="{D4A44E2B-714B-774B-BFB3-DD6F079AF3F0}" type="datetimeFigureOut">
-              <a:t>4/3/15</a:t>
+              <a:t>4/15/15</a:t>
             </a:fld>
             <a:endParaRPr lang="en-US"/>
           </a:p>
@@ -1852,7 +1852,7 @@
           <a:lstStyle/>
           <a:p>
             <a:fld id="{D4A44E2B-714B-774B-BFB3-DD6F079AF3F0}" type="datetimeFigureOut">
-              <a:t>4/3/15</a:t>
+              <a:t>4/15/15</a:t>
             </a:fld>
             <a:endParaRPr lang="en-US"/>
           </a:p>
@@ -1945,7 +1945,7 @@
           <a:lstStyle/>
           <a:p>
             <a:fld id="{D4A44E2B-714B-774B-BFB3-DD6F079AF3F0}" type="datetimeFigureOut">
-              <a:t>4/3/15</a:t>
+              <a:t>4/15/15</a:t>
             </a:fld>
             <a:endParaRPr lang="en-US"/>
           </a:p>
@@ -2218,7 +2218,7 @@
           <a:lstStyle/>
           <a:p>
             <a:fld id="{D4A44E2B-714B-774B-BFB3-DD6F079AF3F0}" type="datetimeFigureOut">
-              <a:t>4/3/15</a:t>
+              <a:t>4/15/15</a:t>
             </a:fld>
             <a:endParaRPr lang="en-US"/>
           </a:p>
@@ -2468,7 +2468,7 @@
           <a:lstStyle/>
           <a:p>
             <a:fld id="{D4A44E2B-714B-774B-BFB3-DD6F079AF3F0}" type="datetimeFigureOut">
-              <a:t>4/3/15</a:t>
+              <a:t>4/15/15</a:t>
             </a:fld>
             <a:endParaRPr lang="en-US"/>
           </a:p>
@@ -2677,7 +2677,7 @@
           </a:lstStyle>
           <a:p>
             <a:fld id="{D4A44E2B-714B-774B-BFB3-DD6F079AF3F0}" type="datetimeFigureOut">
-              <a:t>4/3/15</a:t>
+              <a:t>4/15/15</a:t>
             </a:fld>
             <a:endParaRPr lang="en-US"/>
           </a:p>
@@ -3051,6 +3051,40 @@
           <a:chExt cx="0" cy="0"/>
         </a:xfrm>
       </p:grpSpPr>
+      <p:cxnSp>
+        <p:nvCxnSpPr>
+          <p:cNvPr id="17" name="Straight Arrow Connector 16"/>
+          <p:cNvCxnSpPr/>
+          <p:nvPr/>
+        </p:nvCxnSpPr>
+        <p:spPr>
+          <a:xfrm flipH="1">
+            <a:off x="1859702" y="1708800"/>
+            <a:ext cx="294829" cy="729348"/>
+          </a:xfrm>
+          <a:prstGeom prst="straightConnector1">
+            <a:avLst/>
+          </a:prstGeom>
+          <a:ln w="28575" cmpd="sng">
+            <a:headEnd type="none"/>
+            <a:tailEnd type="triangle" w="lg" len="lg"/>
+          </a:ln>
+        </p:spPr>
+        <p:style>
+          <a:lnRef idx="1">
+            <a:schemeClr val="dk1"/>
+          </a:lnRef>
+          <a:fillRef idx="0">
+            <a:schemeClr val="dk1"/>
+          </a:fillRef>
+          <a:effectRef idx="0">
+            <a:schemeClr val="dk1"/>
+          </a:effectRef>
+          <a:fontRef idx="minor">
+            <a:schemeClr val="tx1"/>
+          </a:fontRef>
+        </p:style>
+      </p:cxnSp>
       <p:sp>
         <p:nvSpPr>
           <p:cNvPr id="4" name="Oval 3"/>
@@ -3101,13 +3135,6 @@
               </a:rPr>
               <a:t>Means of Experiment</a:t>
             </a:r>
-            <a:endParaRPr lang="en-US">
-              <a:solidFill>
-                <a:schemeClr val="bg1"/>
-              </a:solidFill>
-              <a:latin typeface="PT Sans"/>
-              <a:cs typeface="PT Sans"/>
-            </a:endParaRPr>
           </a:p>
         </p:txBody>
       </p:sp>
@@ -3195,7 +3222,7 @@
         </p:nvSpPr>
         <p:spPr>
           <a:xfrm>
-            <a:off x="6786847" y="629328"/>
+            <a:off x="6911583" y="882863"/>
             <a:ext cx="711644" cy="320802"/>
           </a:xfrm>
           <a:prstGeom prst="rect">
@@ -3219,83 +3246,6 @@
           </a:p>
         </p:txBody>
       </p:sp>
-      <p:grpSp>
-        <p:nvGrpSpPr>
-          <p:cNvPr id="9" name="Group 8"/>
-          <p:cNvGrpSpPr/>
-          <p:nvPr/>
-        </p:nvGrpSpPr>
-        <p:grpSpPr>
-          <a:xfrm>
-            <a:off x="5555170" y="3384494"/>
-            <a:ext cx="3174999" cy="2100930"/>
-            <a:chOff x="5635990" y="4030531"/>
-            <a:chExt cx="3174999" cy="2100930"/>
-          </a:xfrm>
-        </p:grpSpPr>
-        <p:pic>
-          <p:nvPicPr>
-            <p:cNvPr id="10" name="Picture 9" descr="Screen Shot 2015-02-20 at 9.40.57 AM.png"/>
-            <p:cNvPicPr>
-              <a:picLocks noChangeAspect="1"/>
-            </p:cNvPicPr>
-            <p:nvPr/>
-          </p:nvPicPr>
-          <p:blipFill>
-            <a:blip r:embed="rId3">
-              <a:extLst>
-                <a:ext uri="{28A0092B-C50C-407E-A947-70E740481C1C}">
-                  <a14:useLocalDpi xmlns:a14="http://schemas.microsoft.com/office/drawing/2010/main" val="0"/>
-                </a:ext>
-              </a:extLst>
-            </a:blip>
-            <a:stretch>
-              <a:fillRect/>
-            </a:stretch>
-          </p:blipFill>
-          <p:spPr>
-            <a:xfrm>
-              <a:off x="5635990" y="4416137"/>
-              <a:ext cx="3174999" cy="1715324"/>
-            </a:xfrm>
-            <a:prstGeom prst="rect">
-              <a:avLst/>
-            </a:prstGeom>
-          </p:spPr>
-        </p:pic>
-        <p:sp>
-          <p:nvSpPr>
-            <p:cNvPr id="11" name="TextBox 10"/>
-            <p:cNvSpPr txBox="1"/>
-            <p:nvPr/>
-          </p:nvSpPr>
-          <p:spPr>
-            <a:xfrm>
-              <a:off x="6417394" y="4030531"/>
-              <a:ext cx="1473151" cy="369332"/>
-            </a:xfrm>
-            <a:prstGeom prst="rect">
-              <a:avLst/>
-            </a:prstGeom>
-            <a:noFill/>
-          </p:spPr>
-          <p:txBody>
-            <a:bodyPr wrap="none" rtlCol="0">
-              <a:spAutoFit/>
-            </a:bodyPr>
-            <a:lstStyle/>
-            <a:p>
-              <a:r>
-                <a:rPr lang="en-US">
-                  <a:latin typeface="PT Sans"/>
-                  <a:cs typeface="PT Sans"/>
-                </a:rPr>
-                <a:t>Observations</a:t>
-              </a:r>
-            </a:p>
-          </p:txBody>
-        </p:sp>
-      </p:grpSp>
       <p:cxnSp>
         <p:nvCxnSpPr>
           <p:cNvPr id="12" name="Straight Arrow Connector 11"/>
@@ -3313,8 +3263,9 @@
           <a:prstGeom prst="straightConnector1">
             <a:avLst/>
           </a:prstGeom>
-          <a:ln>
-            <a:tailEnd type="arrow"/>
+          <a:ln w="28575" cmpd="sng">
+            <a:headEnd type="none"/>
+            <a:tailEnd type="triangle" w="lg" len="lg"/>
           </a:ln>
         </p:spPr>
         <p:style>
@@ -3348,8 +3299,9 @@
           <a:prstGeom prst="straightConnector1">
             <a:avLst/>
           </a:prstGeom>
-          <a:ln>
-            <a:tailEnd type="arrow"/>
+          <a:ln w="28575" cmpd="sng">
+            <a:headEnd type="none"/>
+            <a:tailEnd type="triangle" w="lg" len="lg"/>
           </a:ln>
         </p:spPr>
         <p:style>
@@ -3372,7 +3324,6 @@
           <p:cNvPr id="14" name="Straight Arrow Connector 13"/>
           <p:cNvCxnSpPr>
             <a:stCxn id="6" idx="3"/>
-            <a:endCxn id="10" idx="1"/>
           </p:cNvCxnSpPr>
           <p:nvPr/>
         </p:nvCxnSpPr>
@@ -3384,8 +3335,9 @@
           <a:prstGeom prst="straightConnector1">
             <a:avLst/>
           </a:prstGeom>
-          <a:ln>
-            <a:tailEnd type="arrow"/>
+          <a:ln w="28575" cmpd="sng">
+            <a:headEnd type="none"/>
+            <a:tailEnd type="triangle" w="lg" len="lg"/>
           </a:ln>
         </p:spPr>
         <p:style>
@@ -3411,13 +3363,15 @@
         </p:nvSpPr>
         <p:spPr>
           <a:xfrm>
-            <a:off x="382209" y="715817"/>
-            <a:ext cx="4065917" cy="1015663"/>
+            <a:off x="382208" y="783857"/>
+            <a:ext cx="3881496" cy="1015663"/>
           </a:xfrm>
           <a:prstGeom prst="rect">
             <a:avLst/>
           </a:prstGeom>
-          <a:noFill/>
+          <a:solidFill>
+            <a:srgbClr val="FFFFFF"/>
+          </a:solidFill>
           <a:ln>
             <a:solidFill>
               <a:srgbClr val="000000"/>
@@ -3425,7 +3379,7 @@
           </a:ln>
         </p:spPr>
         <p:txBody>
-          <a:bodyPr wrap="none" rtlCol="0">
+          <a:bodyPr wrap="square" rtlCol="0">
             <a:spAutoFit/>
           </a:bodyPr>
           <a:lstStyle/>
@@ -3442,25 +3396,7 @@
                 <a:latin typeface="PT Sans"/>
                 <a:cs typeface="PT Sans"/>
               </a:rPr>
-              <a:t> Show that my</a:t>
-            </a:r>
-          </a:p>
-          <a:p>
-            <a:r>
-              <a:rPr lang="en-US" sz="2000">
-                <a:latin typeface="PT Sans"/>
-                <a:cs typeface="PT Sans"/>
-              </a:rPr>
-              <a:t>algorithm/system/etc. is better than</a:t>
-            </a:r>
-          </a:p>
-          <a:p>
-            <a:r>
-              <a:rPr lang="en-US" sz="2000">
-                <a:latin typeface="PT Sans"/>
-                <a:cs typeface="PT Sans"/>
-              </a:rPr>
-              <a:t>the state-of-the-art.</a:t>
+              <a:t> Show that my system or algorithm improves the current state-of-the-art.</a:t>
             </a:r>
           </a:p>
         </p:txBody>
@@ -3474,7 +3410,7 @@
           <p:nvPr/>
         </p:nvPicPr>
         <p:blipFill rotWithShape="1">
-          <a:blip r:embed="rId4">
+          <a:blip r:embed="rId3">
             <a:extLst>
               <a:ext uri="{28A0092B-C50C-407E-A947-70E740481C1C}">
                 <a14:useLocalDpi xmlns:a14="http://schemas.microsoft.com/office/drawing/2010/main" val="0"/>
@@ -3486,7 +3422,7 @@
         </p:blipFill>
         <p:spPr>
           <a:xfrm>
-            <a:off x="5504634" y="1071469"/>
+            <a:off x="5504634" y="1203665"/>
             <a:ext cx="3548803" cy="2048054"/>
           </a:xfrm>
           <a:prstGeom prst="rect">
@@ -3500,6 +3436,83 @@
           </a:effectLst>
         </p:spPr>
       </p:pic>
+      <p:grpSp>
+        <p:nvGrpSpPr>
+          <p:cNvPr id="3" name="Group 2"/>
+          <p:cNvGrpSpPr/>
+          <p:nvPr/>
+        </p:nvGrpSpPr>
+        <p:grpSpPr>
+          <a:xfrm>
+            <a:off x="5638556" y="3611516"/>
+            <a:ext cx="3269767" cy="1646923"/>
+            <a:chOff x="5504634" y="3384494"/>
+            <a:chExt cx="3269767" cy="1646923"/>
+          </a:xfrm>
+        </p:grpSpPr>
+        <p:sp>
+          <p:nvSpPr>
+            <p:cNvPr id="11" name="TextBox 10"/>
+            <p:cNvSpPr txBox="1"/>
+            <p:nvPr/>
+          </p:nvSpPr>
+          <p:spPr>
+            <a:xfrm>
+              <a:off x="6402942" y="3384494"/>
+              <a:ext cx="1473151" cy="369332"/>
+            </a:xfrm>
+            <a:prstGeom prst="rect">
+              <a:avLst/>
+            </a:prstGeom>
+            <a:noFill/>
+          </p:spPr>
+          <p:txBody>
+            <a:bodyPr wrap="none" rtlCol="0">
+              <a:spAutoFit/>
+            </a:bodyPr>
+            <a:lstStyle/>
+            <a:p>
+              <a:r>
+                <a:rPr lang="en-US">
+                  <a:latin typeface="PT Sans"/>
+                  <a:cs typeface="PT Sans"/>
+                </a:rPr>
+                <a:t>Observations</a:t>
+              </a:r>
+            </a:p>
+          </p:txBody>
+        </p:sp>
+        <p:pic>
+          <p:nvPicPr>
+            <p:cNvPr id="2" name="Picture 1" descr="Screen Shot 2015-04-15 at 10.39.09 AM.png"/>
+            <p:cNvPicPr>
+              <a:picLocks noChangeAspect="1"/>
+            </p:cNvPicPr>
+            <p:nvPr/>
+          </p:nvPicPr>
+          <p:blipFill>
+            <a:blip r:embed="rId4">
+              <a:extLst>
+                <a:ext uri="{28A0092B-C50C-407E-A947-70E740481C1C}">
+                  <a14:useLocalDpi xmlns:a14="http://schemas.microsoft.com/office/drawing/2010/main" val="0"/>
+                </a:ext>
+              </a:extLst>
+            </a:blip>
+            <a:stretch>
+              <a:fillRect/>
+            </a:stretch>
+          </p:blipFill>
+          <p:spPr>
+            <a:xfrm>
+              <a:off x="5504634" y="3753826"/>
+              <a:ext cx="3269767" cy="1277591"/>
+            </a:xfrm>
+            <a:prstGeom prst="rect">
+              <a:avLst/>
+            </a:prstGeom>
+          </p:spPr>
+        </p:pic>
+      </p:grpSp>
     </p:spTree>
     <p:extLst>
       <p:ext uri="{BB962C8B-B14F-4D97-AF65-F5344CB8AC3E}">
@@ -3530,6 +3543,844 @@
           <a:chExt cx="0" cy="0"/>
         </a:xfrm>
       </p:grpSpPr>
+      <p:grpSp>
+        <p:nvGrpSpPr>
+          <p:cNvPr id="17" name="Group 16"/>
+          <p:cNvGrpSpPr/>
+          <p:nvPr/>
+        </p:nvGrpSpPr>
+        <p:grpSpPr>
+          <a:xfrm>
+            <a:off x="283491" y="1374136"/>
+            <a:ext cx="8205795" cy="4778668"/>
+            <a:chOff x="283491" y="1374136"/>
+            <a:chExt cx="8205795" cy="4778668"/>
+          </a:xfrm>
+        </p:grpSpPr>
+        <p:sp>
+          <p:nvSpPr>
+            <p:cNvPr id="2" name="TextBox 1"/>
+            <p:cNvSpPr txBox="1"/>
+            <p:nvPr/>
+          </p:nvSpPr>
+          <p:spPr>
+            <a:xfrm>
+              <a:off x="283491" y="1831146"/>
+              <a:ext cx="1220942" cy="1077218"/>
+            </a:xfrm>
+            <a:prstGeom prst="rect">
+              <a:avLst/>
+            </a:prstGeom>
+            <a:noFill/>
+            <a:ln/>
+          </p:spPr>
+          <p:style>
+            <a:lnRef idx="2">
+              <a:schemeClr val="dk1"/>
+            </a:lnRef>
+            <a:fillRef idx="1">
+              <a:schemeClr val="lt1"/>
+            </a:fillRef>
+            <a:effectRef idx="0">
+              <a:schemeClr val="dk1"/>
+            </a:effectRef>
+            <a:fontRef idx="minor">
+              <a:schemeClr val="dk1"/>
+            </a:fontRef>
+          </p:style>
+          <p:txBody>
+            <a:bodyPr wrap="square" rtlCol="0">
+              <a:spAutoFit/>
+            </a:bodyPr>
+            <a:lstStyle/>
+            <a:p>
+              <a:pPr algn="ctr"/>
+              <a:r>
+                <a:rPr lang="en-US" sz="1600">
+                  <a:latin typeface="PT Sans"/>
+                  <a:cs typeface="PT Sans"/>
+                </a:rPr>
+                <a:t>Obtain/recreate</a:t>
+              </a:r>
+            </a:p>
+            <a:p>
+              <a:pPr algn="ctr"/>
+              <a:r>
+                <a:rPr lang="en-US" sz="1600">
+                  <a:latin typeface="PT Sans"/>
+                  <a:cs typeface="PT Sans"/>
+                </a:rPr>
+                <a:t>means of experiment.</a:t>
+              </a:r>
+            </a:p>
+          </p:txBody>
+        </p:sp>
+        <p:cxnSp>
+          <p:nvCxnSpPr>
+            <p:cNvPr id="3" name="Straight Arrow Connector 2"/>
+            <p:cNvCxnSpPr>
+              <a:stCxn id="2" idx="3"/>
+              <a:endCxn id="166" idx="1"/>
+            </p:cNvCxnSpPr>
+            <p:nvPr/>
+          </p:nvCxnSpPr>
+          <p:spPr>
+            <a:xfrm>
+              <a:off x="1504433" y="2369755"/>
+              <a:ext cx="358529" cy="11338"/>
+            </a:xfrm>
+            <a:prstGeom prst="straightConnector1">
+              <a:avLst/>
+            </a:prstGeom>
+            <a:ln w="28575" cmpd="sng">
+              <a:headEnd type="none"/>
+              <a:tailEnd type="triangle" w="lg" len="lg"/>
+            </a:ln>
+          </p:spPr>
+          <p:style>
+            <a:lnRef idx="1">
+              <a:schemeClr val="dk1"/>
+            </a:lnRef>
+            <a:fillRef idx="0">
+              <a:schemeClr val="dk1"/>
+            </a:fillRef>
+            <a:effectRef idx="0">
+              <a:schemeClr val="dk1"/>
+            </a:effectRef>
+            <a:fontRef idx="minor">
+              <a:schemeClr val="tx1"/>
+            </a:fontRef>
+          </p:style>
+        </p:cxnSp>
+        <p:cxnSp>
+          <p:nvCxnSpPr>
+            <p:cNvPr id="15" name="Straight Arrow Connector 14"/>
+            <p:cNvCxnSpPr>
+              <a:stCxn id="166" idx="3"/>
+              <a:endCxn id="16" idx="1"/>
+            </p:cNvCxnSpPr>
+            <p:nvPr/>
+          </p:nvCxnSpPr>
+          <p:spPr>
+            <a:xfrm flipV="1">
+              <a:off x="4431277" y="2374043"/>
+              <a:ext cx="373348" cy="7050"/>
+            </a:xfrm>
+            <a:prstGeom prst="straightConnector1">
+              <a:avLst/>
+            </a:prstGeom>
+            <a:ln w="28575" cmpd="sng">
+              <a:headEnd type="none"/>
+              <a:tailEnd type="triangle" w="lg" len="lg"/>
+            </a:ln>
+          </p:spPr>
+          <p:style>
+            <a:lnRef idx="1">
+              <a:schemeClr val="dk1"/>
+            </a:lnRef>
+            <a:fillRef idx="0">
+              <a:schemeClr val="dk1"/>
+            </a:fillRef>
+            <a:effectRef idx="0">
+              <a:schemeClr val="dk1"/>
+            </a:effectRef>
+            <a:fontRef idx="minor">
+              <a:schemeClr val="tx1"/>
+            </a:fontRef>
+          </p:style>
+        </p:cxnSp>
+        <p:sp>
+          <p:nvSpPr>
+            <p:cNvPr id="16" name="TextBox 15"/>
+            <p:cNvSpPr txBox="1"/>
+            <p:nvPr/>
+          </p:nvSpPr>
+          <p:spPr>
+            <a:xfrm>
+              <a:off x="4804625" y="1958545"/>
+              <a:ext cx="1401163" cy="830998"/>
+            </a:xfrm>
+            <a:prstGeom prst="rect">
+              <a:avLst/>
+            </a:prstGeom>
+            <a:noFill/>
+            <a:ln/>
+          </p:spPr>
+          <p:style>
+            <a:lnRef idx="2">
+              <a:schemeClr val="dk1"/>
+            </a:lnRef>
+            <a:fillRef idx="1">
+              <a:schemeClr val="lt1"/>
+            </a:fillRef>
+            <a:effectRef idx="0">
+              <a:schemeClr val="dk1"/>
+            </a:effectRef>
+            <a:fontRef idx="minor">
+              <a:schemeClr val="dk1"/>
+            </a:fontRef>
+          </p:style>
+          <p:txBody>
+            <a:bodyPr wrap="square" rtlCol="0">
+              <a:spAutoFit/>
+            </a:bodyPr>
+            <a:lstStyle/>
+            <a:p>
+              <a:pPr algn="ctr"/>
+              <a:r>
+                <a:rPr lang="en-US" sz="1600">
+                  <a:latin typeface="PT Sans"/>
+                  <a:cs typeface="PT Sans"/>
+                </a:rPr>
+                <a:t>Original work findings are corroborated</a:t>
+              </a:r>
+            </a:p>
+          </p:txBody>
+        </p:sp>
+        <p:cxnSp>
+          <p:nvCxnSpPr>
+            <p:cNvPr id="18" name="Straight Arrow Connector 17"/>
+            <p:cNvCxnSpPr>
+              <a:stCxn id="166" idx="2"/>
+              <a:endCxn id="147" idx="1"/>
+            </p:cNvCxnSpPr>
+            <p:nvPr/>
+          </p:nvCxnSpPr>
+          <p:spPr>
+            <a:xfrm rot="16200000" flipH="1">
+              <a:off x="3175044" y="3360127"/>
+              <a:ext cx="918242" cy="974090"/>
+            </a:xfrm>
+            <a:prstGeom prst="bentConnector2">
+              <a:avLst/>
+            </a:prstGeom>
+            <a:ln w="28575" cmpd="sng">
+              <a:headEnd type="none"/>
+              <a:tailEnd type="triangle" w="lg" len="lg"/>
+            </a:ln>
+          </p:spPr>
+          <p:style>
+            <a:lnRef idx="1">
+              <a:schemeClr val="dk1"/>
+            </a:lnRef>
+            <a:fillRef idx="0">
+              <a:schemeClr val="dk1"/>
+            </a:fillRef>
+            <a:effectRef idx="0">
+              <a:schemeClr val="dk1"/>
+            </a:effectRef>
+            <a:fontRef idx="minor">
+              <a:schemeClr val="tx1"/>
+            </a:fontRef>
+          </p:style>
+        </p:cxnSp>
+        <p:cxnSp>
+          <p:nvCxnSpPr>
+            <p:cNvPr id="51" name="Straight Arrow Connector 50"/>
+            <p:cNvCxnSpPr>
+              <a:stCxn id="147" idx="3"/>
+              <a:endCxn id="54" idx="1"/>
+            </p:cNvCxnSpPr>
+            <p:nvPr/>
+          </p:nvCxnSpPr>
+          <p:spPr>
+            <a:xfrm>
+              <a:off x="6689525" y="4306293"/>
+              <a:ext cx="614299" cy="7549"/>
+            </a:xfrm>
+            <a:prstGeom prst="straightConnector1">
+              <a:avLst/>
+            </a:prstGeom>
+            <a:ln w="28575" cmpd="sng">
+              <a:headEnd type="none"/>
+              <a:tailEnd type="triangle" w="lg" len="lg"/>
+            </a:ln>
+          </p:spPr>
+          <p:style>
+            <a:lnRef idx="1">
+              <a:schemeClr val="dk1"/>
+            </a:lnRef>
+            <a:fillRef idx="0">
+              <a:schemeClr val="dk1"/>
+            </a:fillRef>
+            <a:effectRef idx="0">
+              <a:schemeClr val="dk1"/>
+            </a:effectRef>
+            <a:fontRef idx="minor">
+              <a:schemeClr val="tx1"/>
+            </a:fontRef>
+          </p:style>
+        </p:cxnSp>
+        <p:sp>
+          <p:nvSpPr>
+            <p:cNvPr id="54" name="TextBox 53"/>
+            <p:cNvSpPr txBox="1"/>
+            <p:nvPr/>
+          </p:nvSpPr>
+          <p:spPr>
+            <a:xfrm>
+              <a:off x="7303824" y="3898344"/>
+              <a:ext cx="1185462" cy="830998"/>
+            </a:xfrm>
+            <a:prstGeom prst="rect">
+              <a:avLst/>
+            </a:prstGeom>
+            <a:noFill/>
+            <a:ln/>
+          </p:spPr>
+          <p:style>
+            <a:lnRef idx="2">
+              <a:schemeClr val="dk1"/>
+            </a:lnRef>
+            <a:fillRef idx="1">
+              <a:schemeClr val="lt1"/>
+            </a:fillRef>
+            <a:effectRef idx="0">
+              <a:schemeClr val="dk1"/>
+            </a:effectRef>
+            <a:fontRef idx="minor">
+              <a:schemeClr val="dk1"/>
+            </a:fontRef>
+          </p:style>
+          <p:txBody>
+            <a:bodyPr wrap="square" rtlCol="0">
+              <a:spAutoFit/>
+            </a:bodyPr>
+            <a:lstStyle/>
+            <a:p>
+              <a:pPr algn="ctr"/>
+              <a:r>
+                <a:rPr lang="en-US" sz="1600">
+                  <a:latin typeface="PT Sans"/>
+                  <a:cs typeface="PT Sans"/>
+                </a:rPr>
+                <a:t>Update means of experiment</a:t>
+              </a:r>
+            </a:p>
+          </p:txBody>
+        </p:sp>
+        <p:sp>
+          <p:nvSpPr>
+            <p:cNvPr id="57" name="TextBox 56"/>
+            <p:cNvSpPr txBox="1"/>
+            <p:nvPr/>
+          </p:nvSpPr>
+          <p:spPr>
+            <a:xfrm>
+              <a:off x="7303824" y="5075586"/>
+              <a:ext cx="1185462" cy="1077218"/>
+            </a:xfrm>
+            <a:prstGeom prst="rect">
+              <a:avLst/>
+            </a:prstGeom>
+            <a:noFill/>
+            <a:ln/>
+          </p:spPr>
+          <p:style>
+            <a:lnRef idx="2">
+              <a:schemeClr val="dk1"/>
+            </a:lnRef>
+            <a:fillRef idx="1">
+              <a:schemeClr val="lt1"/>
+            </a:fillRef>
+            <a:effectRef idx="0">
+              <a:schemeClr val="dk1"/>
+            </a:effectRef>
+            <a:fontRef idx="minor">
+              <a:schemeClr val="dk1"/>
+            </a:fontRef>
+          </p:style>
+          <p:txBody>
+            <a:bodyPr wrap="square" rtlCol="0">
+              <a:spAutoFit/>
+            </a:bodyPr>
+            <a:lstStyle/>
+            <a:p>
+              <a:pPr algn="ctr"/>
+              <a:r>
+                <a:rPr lang="en-US" sz="1600">
+                  <a:latin typeface="PT Sans"/>
+                  <a:cs typeface="PT Sans"/>
+                </a:rPr>
+                <a:t>Cannot validate original claims</a:t>
+              </a:r>
+            </a:p>
+          </p:txBody>
+        </p:sp>
+        <p:cxnSp>
+          <p:nvCxnSpPr>
+            <p:cNvPr id="114" name="Straight Arrow Connector 113"/>
+            <p:cNvCxnSpPr>
+              <a:stCxn id="147" idx="2"/>
+              <a:endCxn id="57" idx="1"/>
+            </p:cNvCxnSpPr>
+            <p:nvPr/>
+          </p:nvCxnSpPr>
+          <p:spPr>
+            <a:xfrm rot="16200000" flipH="1">
+              <a:off x="6204124" y="4514496"/>
+              <a:ext cx="300944" cy="1898456"/>
+            </a:xfrm>
+            <a:prstGeom prst="bentConnector2">
+              <a:avLst/>
+            </a:prstGeom>
+            <a:ln w="28575" cmpd="sng">
+              <a:headEnd type="none"/>
+              <a:tailEnd type="triangle" w="lg" len="lg"/>
+            </a:ln>
+          </p:spPr>
+          <p:style>
+            <a:lnRef idx="1">
+              <a:schemeClr val="dk1"/>
+            </a:lnRef>
+            <a:fillRef idx="0">
+              <a:schemeClr val="dk1"/>
+            </a:fillRef>
+            <a:effectRef idx="0">
+              <a:schemeClr val="dk1"/>
+            </a:effectRef>
+            <a:fontRef idx="minor">
+              <a:schemeClr val="tx1"/>
+            </a:fontRef>
+          </p:style>
+        </p:cxnSp>
+        <p:sp>
+          <p:nvSpPr>
+            <p:cNvPr id="137" name="TextBox 136"/>
+            <p:cNvSpPr txBox="1"/>
+            <p:nvPr/>
+          </p:nvSpPr>
+          <p:spPr>
+            <a:xfrm>
+              <a:off x="4286384" y="1996867"/>
+              <a:ext cx="522007" cy="338553"/>
+            </a:xfrm>
+            <a:prstGeom prst="rect">
+              <a:avLst/>
+            </a:prstGeom>
+            <a:noFill/>
+            <a:ln>
+              <a:noFill/>
+            </a:ln>
+          </p:spPr>
+          <p:style>
+            <a:lnRef idx="2">
+              <a:schemeClr val="dk1"/>
+            </a:lnRef>
+            <a:fillRef idx="1">
+              <a:schemeClr val="lt1"/>
+            </a:fillRef>
+            <a:effectRef idx="0">
+              <a:schemeClr val="dk1"/>
+            </a:effectRef>
+            <a:fontRef idx="minor">
+              <a:schemeClr val="dk1"/>
+            </a:fontRef>
+          </p:style>
+          <p:txBody>
+            <a:bodyPr wrap="square" rtlCol="0">
+              <a:spAutoFit/>
+            </a:bodyPr>
+            <a:lstStyle/>
+            <a:p>
+              <a:pPr algn="ctr"/>
+              <a:r>
+                <a:rPr lang="en-US" sz="1600">
+                  <a:latin typeface="PT Sans"/>
+                  <a:cs typeface="PT Sans"/>
+                </a:rPr>
+                <a:t>no</a:t>
+              </a:r>
+            </a:p>
+          </p:txBody>
+        </p:sp>
+        <p:sp>
+          <p:nvSpPr>
+            <p:cNvPr id="138" name="TextBox 137"/>
+            <p:cNvSpPr txBox="1"/>
+            <p:nvPr/>
+          </p:nvSpPr>
+          <p:spPr>
+            <a:xfrm>
+              <a:off x="3299834" y="3977900"/>
+              <a:ext cx="483692" cy="338554"/>
+            </a:xfrm>
+            <a:prstGeom prst="rect">
+              <a:avLst/>
+            </a:prstGeom>
+            <a:noFill/>
+            <a:ln>
+              <a:noFill/>
+            </a:ln>
+          </p:spPr>
+          <p:style>
+            <a:lnRef idx="2">
+              <a:schemeClr val="dk1"/>
+            </a:lnRef>
+            <a:fillRef idx="1">
+              <a:schemeClr val="lt1"/>
+            </a:fillRef>
+            <a:effectRef idx="0">
+              <a:schemeClr val="dk1"/>
+            </a:effectRef>
+            <a:fontRef idx="minor">
+              <a:schemeClr val="dk1"/>
+            </a:fontRef>
+          </p:style>
+          <p:txBody>
+            <a:bodyPr wrap="square" rtlCol="0">
+              <a:spAutoFit/>
+            </a:bodyPr>
+            <a:lstStyle/>
+            <a:p>
+              <a:pPr algn="ctr"/>
+              <a:r>
+                <a:rPr lang="en-US" sz="1600">
+                  <a:latin typeface="PT Sans"/>
+                  <a:cs typeface="PT Sans"/>
+                </a:rPr>
+                <a:t>yes</a:t>
+              </a:r>
+            </a:p>
+          </p:txBody>
+        </p:sp>
+        <p:sp>
+          <p:nvSpPr>
+            <p:cNvPr id="139" name="TextBox 138"/>
+            <p:cNvSpPr txBox="1"/>
+            <p:nvPr/>
+          </p:nvSpPr>
+          <p:spPr>
+            <a:xfrm>
+              <a:off x="6205789" y="5248560"/>
+              <a:ext cx="402916" cy="338553"/>
+            </a:xfrm>
+            <a:prstGeom prst="rect">
+              <a:avLst/>
+            </a:prstGeom>
+            <a:noFill/>
+            <a:ln>
+              <a:noFill/>
+            </a:ln>
+          </p:spPr>
+          <p:style>
+            <a:lnRef idx="2">
+              <a:schemeClr val="dk1"/>
+            </a:lnRef>
+            <a:fillRef idx="1">
+              <a:schemeClr val="lt1"/>
+            </a:fillRef>
+            <a:effectRef idx="0">
+              <a:schemeClr val="dk1"/>
+            </a:effectRef>
+            <a:fontRef idx="minor">
+              <a:schemeClr val="dk1"/>
+            </a:fontRef>
+          </p:style>
+          <p:txBody>
+            <a:bodyPr wrap="square" rtlCol="0">
+              <a:spAutoFit/>
+            </a:bodyPr>
+            <a:lstStyle/>
+            <a:p>
+              <a:pPr algn="ctr"/>
+              <a:r>
+                <a:rPr lang="en-US" sz="1600">
+                  <a:latin typeface="PT Sans"/>
+                  <a:cs typeface="PT Sans"/>
+                </a:rPr>
+                <a:t>no</a:t>
+              </a:r>
+            </a:p>
+          </p:txBody>
+        </p:sp>
+        <p:sp>
+          <p:nvSpPr>
+            <p:cNvPr id="140" name="TextBox 139"/>
+            <p:cNvSpPr txBox="1"/>
+            <p:nvPr/>
+          </p:nvSpPr>
+          <p:spPr>
+            <a:xfrm>
+              <a:off x="6689525" y="3967222"/>
+              <a:ext cx="472020" cy="338553"/>
+            </a:xfrm>
+            <a:prstGeom prst="rect">
+              <a:avLst/>
+            </a:prstGeom>
+            <a:noFill/>
+            <a:ln>
+              <a:noFill/>
+            </a:ln>
+          </p:spPr>
+          <p:style>
+            <a:lnRef idx="2">
+              <a:schemeClr val="dk1"/>
+            </a:lnRef>
+            <a:fillRef idx="1">
+              <a:schemeClr val="lt1"/>
+            </a:fillRef>
+            <a:effectRef idx="0">
+              <a:schemeClr val="dk1"/>
+            </a:effectRef>
+            <a:fontRef idx="minor">
+              <a:schemeClr val="dk1"/>
+            </a:fontRef>
+          </p:style>
+          <p:txBody>
+            <a:bodyPr wrap="square" rtlCol="0">
+              <a:spAutoFit/>
+            </a:bodyPr>
+            <a:lstStyle/>
+            <a:p>
+              <a:pPr algn="ctr"/>
+              <a:r>
+                <a:rPr lang="en-US" sz="1600">
+                  <a:latin typeface="PT Sans"/>
+                  <a:cs typeface="PT Sans"/>
+                </a:rPr>
+                <a:t>yes</a:t>
+              </a:r>
+            </a:p>
+          </p:txBody>
+        </p:sp>
+        <p:grpSp>
+          <p:nvGrpSpPr>
+            <p:cNvPr id="179" name="Group 178"/>
+            <p:cNvGrpSpPr/>
+            <p:nvPr/>
+          </p:nvGrpSpPr>
+          <p:grpSpPr>
+            <a:xfrm>
+              <a:off x="4121210" y="3299335"/>
+              <a:ext cx="2568315" cy="2013916"/>
+              <a:chOff x="2732801" y="3038852"/>
+              <a:chExt cx="2993664" cy="1291481"/>
+            </a:xfrm>
+            <a:noFill/>
+          </p:grpSpPr>
+          <p:sp>
+            <p:nvSpPr>
+              <p:cNvPr id="147" name="Diamond 146"/>
+              <p:cNvSpPr/>
+              <p:nvPr/>
+            </p:nvSpPr>
+            <p:spPr>
+              <a:xfrm>
+                <a:off x="2732801" y="3038852"/>
+                <a:ext cx="2993664" cy="1291481"/>
+              </a:xfrm>
+              <a:prstGeom prst="diamond">
+                <a:avLst/>
+              </a:prstGeom>
+              <a:grpFill/>
+              <a:ln/>
+            </p:spPr>
+            <p:style>
+              <a:lnRef idx="2">
+                <a:schemeClr val="dk1"/>
+              </a:lnRef>
+              <a:fillRef idx="1">
+                <a:schemeClr val="lt1"/>
+              </a:fillRef>
+              <a:effectRef idx="0">
+                <a:schemeClr val="dk1"/>
+              </a:effectRef>
+              <a:fontRef idx="minor">
+                <a:schemeClr val="dk1"/>
+              </a:fontRef>
+            </p:style>
+            <p:txBody>
+              <a:bodyPr rtlCol="0" anchor="ctr"/>
+              <a:lstStyle/>
+              <a:p>
+                <a:pPr algn="ctr"/>
+                <a:endParaRPr lang="en-US" sz="2000"/>
+              </a:p>
+            </p:txBody>
+          </p:sp>
+          <p:sp>
+            <p:nvSpPr>
+              <p:cNvPr id="152" name="TextBox 151"/>
+              <p:cNvSpPr txBox="1"/>
+              <p:nvPr/>
+            </p:nvSpPr>
+            <p:spPr>
+              <a:xfrm>
+                <a:off x="3141209" y="3311294"/>
+                <a:ext cx="2176848" cy="848693"/>
+              </a:xfrm>
+              <a:prstGeom prst="rect">
+                <a:avLst/>
+              </a:prstGeom>
+              <a:grpFill/>
+            </p:spPr>
+            <p:txBody>
+              <a:bodyPr wrap="square" rtlCol="0">
+                <a:spAutoFit/>
+              </a:bodyPr>
+              <a:lstStyle/>
+              <a:p>
+                <a:pPr algn="ctr"/>
+                <a:r>
+                  <a:rPr lang="en-US" sz="1600">
+                    <a:latin typeface="PT Sans"/>
+                    <a:cs typeface="PT Sans"/>
+                  </a:rPr>
+                  <a:t>Any significant differences between original and recreated means?</a:t>
+                </a:r>
+              </a:p>
+            </p:txBody>
+          </p:sp>
+        </p:grpSp>
+        <p:grpSp>
+          <p:nvGrpSpPr>
+            <p:cNvPr id="180" name="Group 179"/>
+            <p:cNvGrpSpPr/>
+            <p:nvPr/>
+          </p:nvGrpSpPr>
+          <p:grpSpPr>
+            <a:xfrm>
+              <a:off x="1862962" y="1374136"/>
+              <a:ext cx="2568315" cy="2013916"/>
+              <a:chOff x="429416" y="1452723"/>
+              <a:chExt cx="2993664" cy="1291481"/>
+            </a:xfrm>
+            <a:noFill/>
+          </p:grpSpPr>
+          <p:sp>
+            <p:nvSpPr>
+              <p:cNvPr id="11" name="TextBox 10"/>
+              <p:cNvSpPr txBox="1"/>
+              <p:nvPr/>
+            </p:nvSpPr>
+            <p:spPr>
+              <a:xfrm>
+                <a:off x="729620" y="1750830"/>
+                <a:ext cx="2524570" cy="690797"/>
+              </a:xfrm>
+              <a:prstGeom prst="rect">
+                <a:avLst/>
+              </a:prstGeom>
+              <a:grpFill/>
+              <a:ln>
+                <a:solidFill>
+                  <a:srgbClr val="FFFFFF"/>
+                </a:solidFill>
+              </a:ln>
+            </p:spPr>
+            <p:style>
+              <a:lnRef idx="2">
+                <a:schemeClr val="dk1"/>
+              </a:lnRef>
+              <a:fillRef idx="1">
+                <a:schemeClr val="lt1"/>
+              </a:fillRef>
+              <a:effectRef idx="0">
+                <a:schemeClr val="dk1"/>
+              </a:effectRef>
+              <a:fontRef idx="minor">
+                <a:schemeClr val="dk1"/>
+              </a:fontRef>
+            </p:style>
+            <p:txBody>
+              <a:bodyPr wrap="square" rtlCol="0">
+                <a:spAutoFit/>
+              </a:bodyPr>
+              <a:lstStyle/>
+              <a:p>
+                <a:pPr algn="ctr"/>
+                <a:r>
+                  <a:rPr lang="en-US" sz="1600">
+                    <a:latin typeface="PT Sans"/>
+                    <a:cs typeface="PT Sans"/>
+                  </a:rPr>
+                  <a:t>Re-run and check validation clauses against output. Any validation failed?</a:t>
+                </a:r>
+              </a:p>
+            </p:txBody>
+          </p:sp>
+          <p:sp>
+            <p:nvSpPr>
+              <p:cNvPr id="166" name="Diamond 165"/>
+              <p:cNvSpPr/>
+              <p:nvPr/>
+            </p:nvSpPr>
+            <p:spPr>
+              <a:xfrm>
+                <a:off x="429416" y="1452723"/>
+                <a:ext cx="2993664" cy="1291481"/>
+              </a:xfrm>
+              <a:prstGeom prst="diamond">
+                <a:avLst/>
+              </a:prstGeom>
+              <a:grpFill/>
+              <a:ln/>
+            </p:spPr>
+            <p:style>
+              <a:lnRef idx="2">
+                <a:schemeClr val="dk1"/>
+              </a:lnRef>
+              <a:fillRef idx="1">
+                <a:schemeClr val="lt1"/>
+              </a:fillRef>
+              <a:effectRef idx="0">
+                <a:schemeClr val="dk1"/>
+              </a:effectRef>
+              <a:fontRef idx="minor">
+                <a:schemeClr val="dk1"/>
+              </a:fontRef>
+            </p:style>
+            <p:txBody>
+              <a:bodyPr rtlCol="0" anchor="ctr"/>
+              <a:lstStyle/>
+              <a:p>
+                <a:pPr algn="ctr"/>
+                <a:endParaRPr lang="en-US" sz="2000"/>
+              </a:p>
+            </p:txBody>
+          </p:sp>
+        </p:grpSp>
+        <p:cxnSp>
+          <p:nvCxnSpPr>
+            <p:cNvPr id="192" name="Straight Arrow Connector 113"/>
+            <p:cNvCxnSpPr>
+              <a:stCxn id="54" idx="0"/>
+              <a:endCxn id="166" idx="0"/>
+            </p:cNvCxnSpPr>
+            <p:nvPr/>
+          </p:nvCxnSpPr>
+          <p:spPr>
+            <a:xfrm rot="16200000" flipV="1">
+              <a:off x="4259735" y="261522"/>
+              <a:ext cx="2524208" cy="4749435"/>
+            </a:xfrm>
+            <a:prstGeom prst="bentConnector3">
+              <a:avLst>
+                <a:gd name="adj1" fmla="val 116244"/>
+              </a:avLst>
+            </a:prstGeom>
+            <a:ln w="28575" cmpd="sng">
+              <a:headEnd type="none"/>
+              <a:tailEnd type="triangle" w="lg" len="lg"/>
+            </a:ln>
+          </p:spPr>
+          <p:style>
+            <a:lnRef idx="1">
+              <a:schemeClr val="dk1"/>
+            </a:lnRef>
+            <a:fillRef idx="0">
+              <a:schemeClr val="dk1"/>
+            </a:fillRef>
+            <a:effectRef idx="0">
+              <a:schemeClr val="dk1"/>
+            </a:effectRef>
+            <a:fontRef idx="minor">
+              <a:schemeClr val="tx1"/>
+            </a:fontRef>
+          </p:style>
+        </p:cxnSp>
+      </p:grpSp>
     </p:spTree>
     <p:extLst>
       <p:ext uri="{BB962C8B-B14F-4D97-AF65-F5344CB8AC3E}">

</xml_diff>